<commit_message>
TRC 03 als PDF
</commit_message>
<xml_diff>
--- a/training-cards/music moves/Training Cards (TRC)/ger/apprentice/ger_TRC_03_Trainingskarte_layouten_MM_A.pptx
+++ b/training-cards/music moves/Training Cards (TRC)/ger/apprentice/ger_TRC_03_Trainingskarte_layouten_MM_A.pptx
@@ -1460,10 +1460,367 @@
         </p:nvSpPr>
         <p:spPr/>
         <p:txBody>
-          <a:bodyPr/>
+          <a:bodyPr>
+            <a:normAutofit fontScale="92500" lnSpcReduction="10000"/>
+          </a:bodyPr>
           <a:lstStyle/>
           <a:p>
-            <a:endParaRPr lang="de-DE"/>
+            <a:r>
+              <a:rPr lang="de-DE" dirty="0"/>
+              <a:t>Das Layout der Trainingskarten wurde </a:t>
+            </a:r>
+            <a:r>
+              <a:rPr lang="de-DE" dirty="0" smtClean="0"/>
+              <a:t>professionell entworfen</a:t>
+            </a:r>
+            <a:r>
+              <a:rPr lang="de-DE" dirty="0"/>
+              <a:t>. Es steht in </a:t>
+            </a:r>
+            <a:r>
+              <a:rPr lang="de-DE" dirty="0" err="1"/>
+              <a:t>github</a:t>
+            </a:r>
+            <a:r>
+              <a:rPr lang="de-DE" dirty="0"/>
+              <a:t> </a:t>
+            </a:r>
+            <a:r>
+              <a:rPr lang="de-DE" dirty="0" smtClean="0"/>
+              <a:t/>
+            </a:r>
+            <a:br>
+              <a:rPr lang="de-DE" dirty="0" smtClean="0"/>
+            </a:br>
+            <a:r>
+              <a:rPr lang="de-DE" dirty="0" smtClean="0"/>
+              <a:t>(http://</a:t>
+            </a:r>
+            <a:r>
+              <a:rPr lang="de-DE" dirty="0" err="1" smtClean="0"/>
+              <a:t>github.com</a:t>
+            </a:r>
+            <a:r>
+              <a:rPr lang="de-DE" dirty="0" smtClean="0"/>
+              <a:t>/</a:t>
+            </a:r>
+            <a:r>
+              <a:rPr lang="de-DE" dirty="0" err="1" smtClean="0"/>
+              <a:t>Teamtool</a:t>
+            </a:r>
+            <a:r>
+              <a:rPr lang="de-DE" dirty="0" smtClean="0"/>
+              <a:t>/</a:t>
+            </a:r>
+            <a:r>
+              <a:rPr lang="de-DE" dirty="0" err="1" smtClean="0"/>
+              <a:t>training</a:t>
+            </a:r>
+            <a:r>
+              <a:rPr lang="de-DE" dirty="0" smtClean="0"/>
+              <a:t>-cards) </a:t>
+            </a:r>
+            <a:r>
+              <a:rPr lang="de-DE" dirty="0" smtClean="0"/>
+              <a:t>als Vorlage bzw. Schablone frei zur Verfügung.</a:t>
+            </a:r>
+            <a:endParaRPr lang="de-DE" dirty="0">
+              <a:hlinkClick r:id="rId2"/>
+            </a:endParaRPr>
+          </a:p>
+          <a:p>
+            <a:r>
+              <a:rPr lang="de-DE" dirty="0" smtClean="0"/>
+              <a:t>Beim </a:t>
+            </a:r>
+            <a:r>
+              <a:rPr lang="de-DE" dirty="0" err="1" smtClean="0"/>
+              <a:t>Befüllen</a:t>
+            </a:r>
+            <a:r>
+              <a:rPr lang="de-DE" dirty="0" smtClean="0"/>
+              <a:t> </a:t>
+            </a:r>
+            <a:r>
+              <a:rPr lang="de-DE" dirty="0"/>
+              <a:t>gibt es Standards, an die man sich halten sollte, um dem Layout gerecht zu werden.</a:t>
+            </a:r>
+          </a:p>
+          <a:p>
+            <a:r>
+              <a:rPr lang="de-DE" dirty="0"/>
+              <a:t>Der Titel neben dem Logo ist 24 </a:t>
+            </a:r>
+            <a:r>
+              <a:rPr lang="de-DE" dirty="0" err="1"/>
+              <a:t>pt</a:t>
+            </a:r>
+            <a:r>
+              <a:rPr lang="de-DE" dirty="0"/>
+              <a:t> groß und wird in Großbuchstaben geschrieben. Die erste Hälfte der Überschrift ist dick (</a:t>
+            </a:r>
+            <a:r>
+              <a:rPr lang="de-DE" dirty="0" err="1"/>
+              <a:t>Avenir</a:t>
+            </a:r>
+            <a:r>
+              <a:rPr lang="de-DE" dirty="0"/>
+              <a:t> Heavy) und die zweite dünn (</a:t>
+            </a:r>
+            <a:r>
+              <a:rPr lang="de-DE" dirty="0" err="1"/>
+              <a:t>Avenir</a:t>
+            </a:r>
+            <a:r>
+              <a:rPr lang="de-DE" dirty="0"/>
+              <a:t> Book).</a:t>
+            </a:r>
+          </a:p>
+          <a:p>
+            <a:r>
+              <a:rPr lang="de-DE" dirty="0"/>
+              <a:t>Unterhalb des Titels steht der volle Name des Autors in </a:t>
+            </a:r>
+            <a:r>
+              <a:rPr lang="de-DE" dirty="0" err="1"/>
+              <a:t>Avenir</a:t>
+            </a:r>
+            <a:r>
+              <a:rPr lang="de-DE" dirty="0"/>
+              <a:t> mit dunkelgrauen </a:t>
+            </a:r>
+            <a:r>
+              <a:rPr lang="de-DE" dirty="0" smtClean="0"/>
+              <a:t>Großbuchstaben, daneben das Datum der letzten Änderung in grauer, normaler Schrift.</a:t>
+            </a:r>
+            <a:endParaRPr lang="de-DE" dirty="0"/>
+          </a:p>
+          <a:p>
+            <a:r>
+              <a:rPr lang="de-DE" dirty="0"/>
+              <a:t>Die </a:t>
+            </a:r>
+            <a:r>
+              <a:rPr lang="de-DE" dirty="0" err="1"/>
+              <a:t>Bulletpoints</a:t>
+            </a:r>
+            <a:r>
+              <a:rPr lang="de-DE" dirty="0"/>
+              <a:t> auf der Vorderseite sind Pfeile, die Schrift ist </a:t>
+            </a:r>
+            <a:r>
+              <a:rPr lang="de-DE" dirty="0" err="1"/>
+              <a:t>Avenir</a:t>
+            </a:r>
+            <a:r>
+              <a:rPr lang="de-DE" dirty="0"/>
+              <a:t> oder Calibri in dunkelgrau.</a:t>
+            </a:r>
+          </a:p>
+          <a:p>
+            <a:r>
+              <a:rPr lang="de-DE" dirty="0"/>
+              <a:t>Textgröße variiert zwischen 8 </a:t>
+            </a:r>
+            <a:r>
+              <a:rPr lang="de-DE" dirty="0" err="1"/>
+              <a:t>pt</a:t>
+            </a:r>
+            <a:r>
+              <a:rPr lang="de-DE" dirty="0"/>
+              <a:t> und 14 </a:t>
+            </a:r>
+            <a:r>
+              <a:rPr lang="de-DE" dirty="0" err="1"/>
+              <a:t>pt</a:t>
+            </a:r>
+            <a:r>
+              <a:rPr lang="de-DE" dirty="0"/>
+              <a:t>. Die Sprache ist knapp und präzise. Wenn Du das Layout nicht einhalten kannst, weil Du zu viel geschrieben hast, reduziere Deine Worte oder mache aus Deiner Idee zwei Trainingskarten.</a:t>
+            </a:r>
+          </a:p>
+          <a:p>
+            <a:r>
+              <a:rPr lang="de-DE" dirty="0"/>
+              <a:t>Die Anrede auf der Karte ist „per Du“, wobei das „Du“ groß geschrieben wird.</a:t>
+            </a:r>
+          </a:p>
+          <a:p>
+            <a:r>
+              <a:rPr lang="de-DE" dirty="0"/>
+              <a:t>Auf der Rückseite sind die </a:t>
+            </a:r>
+            <a:r>
+              <a:rPr lang="de-DE" dirty="0" err="1" smtClean="0"/>
+              <a:t>Bulletpoints</a:t>
+            </a:r>
+            <a:r>
+              <a:rPr lang="de-DE" dirty="0" smtClean="0"/>
+              <a:t> </a:t>
+            </a:r>
+            <a:r>
+              <a:rPr lang="de-DE" dirty="0"/>
+              <a:t>leere Kästchen.</a:t>
+            </a:r>
+          </a:p>
+          <a:p>
+            <a:r>
+              <a:rPr lang="de-DE" dirty="0"/>
+              <a:t>Je nach Level </a:t>
+            </a:r>
+            <a:r>
+              <a:rPr lang="de-DE" dirty="0" smtClean="0"/>
+              <a:t>sollte</a:t>
+            </a:r>
+            <a:r>
+              <a:rPr lang="de-DE" dirty="0" smtClean="0"/>
+              <a:t> </a:t>
+            </a:r>
+            <a:r>
+              <a:rPr lang="de-DE" dirty="0"/>
+              <a:t>auf der </a:t>
+            </a:r>
+            <a:r>
+              <a:rPr lang="de-DE" dirty="0" smtClean="0"/>
+              <a:t>Rückseite rechts unten </a:t>
+            </a:r>
+            <a:r>
+              <a:rPr lang="de-DE" dirty="0"/>
+              <a:t>das entsprechende Icon eingefügt werden. Standard ist das </a:t>
+            </a:r>
+            <a:r>
+              <a:rPr lang="de-DE" dirty="0" err="1"/>
+              <a:t>Apprentice</a:t>
+            </a:r>
+            <a:r>
+              <a:rPr lang="de-DE" dirty="0"/>
+              <a:t> Icon (</a:t>
+            </a:r>
+            <a:r>
+              <a:rPr lang="de-DE" dirty="0" smtClean="0"/>
+              <a:t>Baseballkappe</a:t>
+            </a:r>
+            <a:r>
+              <a:rPr lang="de-DE" dirty="0"/>
+              <a:t>), aber auch die </a:t>
+            </a:r>
+            <a:r>
+              <a:rPr lang="de-DE" dirty="0" smtClean="0"/>
+              <a:t>Icons </a:t>
+            </a:r>
+            <a:r>
+              <a:rPr lang="de-DE" dirty="0"/>
+              <a:t>der beiden anderen </a:t>
+            </a:r>
+            <a:r>
+              <a:rPr lang="de-DE" dirty="0" smtClean="0"/>
+              <a:t>Level </a:t>
+            </a:r>
+            <a:r>
+              <a:rPr lang="de-DE" dirty="0"/>
+              <a:t>stehen in </a:t>
+            </a:r>
+            <a:r>
+              <a:rPr lang="de-DE" dirty="0" err="1"/>
+              <a:t>github</a:t>
+            </a:r>
+            <a:r>
+              <a:rPr lang="de-DE" dirty="0"/>
+              <a:t> zur Verfügung.</a:t>
+            </a:r>
+          </a:p>
+          <a:p>
+            <a:r>
+              <a:rPr lang="de-DE" dirty="0"/>
+              <a:t>Im rechten oberen Eck gibt es für jede Trainingskarte eine Signatur. Du kannst </a:t>
+            </a:r>
+            <a:r>
+              <a:rPr lang="de-DE" dirty="0" smtClean="0"/>
+              <a:t>Dir </a:t>
+            </a:r>
+            <a:r>
+              <a:rPr lang="de-DE" dirty="0"/>
+              <a:t>selbst ein Identifizierungskonzept ausdenken. Wenn </a:t>
+            </a:r>
+            <a:r>
+              <a:rPr lang="de-DE" dirty="0" smtClean="0"/>
+              <a:t>Du </a:t>
+            </a:r>
+            <a:r>
+              <a:rPr lang="de-DE" dirty="0"/>
+              <a:t>eine offizielle Signatur von der </a:t>
+            </a:r>
+            <a:r>
+              <a:rPr lang="de-DE" dirty="0" err="1"/>
+              <a:t>music</a:t>
+            </a:r>
+            <a:r>
+              <a:rPr lang="de-DE" dirty="0"/>
+              <a:t> </a:t>
+            </a:r>
+            <a:r>
+              <a:rPr lang="de-DE" dirty="0" err="1"/>
+              <a:t>moves</a:t>
+            </a:r>
+            <a:r>
+              <a:rPr lang="de-DE" dirty="0"/>
+              <a:t> </a:t>
+            </a:r>
+            <a:r>
+              <a:rPr lang="de-DE" dirty="0"/>
+              <a:t>C</a:t>
+            </a:r>
+            <a:r>
+              <a:rPr lang="de-DE" dirty="0" smtClean="0"/>
+              <a:t>ommunity </a:t>
+            </a:r>
+            <a:r>
+              <a:rPr lang="de-DE" dirty="0"/>
+              <a:t>haben möchtest, </a:t>
+            </a:r>
+            <a:r>
+              <a:rPr lang="de-DE"/>
+              <a:t>setze </a:t>
+            </a:r>
+            <a:r>
+              <a:rPr lang="de-DE" smtClean="0"/>
+              <a:t>Dich </a:t>
+            </a:r>
+            <a:r>
+              <a:rPr lang="de-DE" dirty="0"/>
+              <a:t>über die Webseite www.music-moves.de </a:t>
+            </a:r>
+            <a:r>
+              <a:rPr lang="de-DE" dirty="0" smtClean="0"/>
+              <a:t>mit ihr in Verbindung.</a:t>
+            </a:r>
+          </a:p>
+          <a:p>
+            <a:r>
+              <a:rPr lang="de-DE" dirty="0" smtClean="0"/>
+              <a:t>Wenn Du Deine Trainingskarte rechtlich schützen lassen willst, kannst Du auf der Rückseite unten mittig eine Creative </a:t>
+            </a:r>
+            <a:r>
+              <a:rPr lang="de-DE" dirty="0" err="1" smtClean="0"/>
+              <a:t>Commons</a:t>
+            </a:r>
+            <a:r>
+              <a:rPr lang="de-DE" dirty="0" smtClean="0"/>
+              <a:t> Lizenz platzieren. Informationen hierzu findest Du </a:t>
+            </a:r>
+            <a:r>
+              <a:rPr lang="de-DE" dirty="0"/>
+              <a:t>unter: http://</a:t>
+            </a:r>
+            <a:r>
+              <a:rPr lang="de-DE" dirty="0" err="1"/>
+              <a:t>de.creativecommons.org</a:t>
+            </a:r>
+            <a:r>
+              <a:rPr lang="de-DE" dirty="0"/>
+              <a:t>/was-ist-cc/</a:t>
+            </a:r>
+            <a:endParaRPr lang="de-DE" dirty="0"/>
           </a:p>
         </p:txBody>
       </p:sp>
@@ -1491,11 +1848,19 @@
             </a:r>
             <a:r>
               <a:rPr lang="de-DE" cap="none" dirty="0" smtClean="0"/>
-              <a:t>zuletzt geändert </a:t>
-            </a:r>
-            <a:r>
-              <a:rPr lang="de-DE" dirty="0" smtClean="0"/>
-              <a:t>am 19. </a:t>
+              <a:t>zuletzt </a:t>
+            </a:r>
+            <a:r>
+              <a:rPr lang="de-DE" cap="none" dirty="0" smtClean="0"/>
+              <a:t>geändert am</a:t>
+            </a:r>
+            <a:r>
+              <a:rPr lang="de-DE" dirty="0" smtClean="0"/>
+              <a:t> </a:t>
+            </a:r>
+            <a:r>
+              <a:rPr lang="de-DE" dirty="0" smtClean="0"/>
+              <a:t>19. </a:t>
             </a:r>
             <a:r>
               <a:rPr lang="de-DE" cap="none" dirty="0" smtClean="0"/>
@@ -1554,7 +1919,47 @@
           <a:bodyPr/>
           <a:lstStyle/>
           <a:p>
-            <a:endParaRPr lang="de-DE"/>
+            <a:r>
+              <a:rPr lang="de-DE" dirty="0"/>
+              <a:t>Layoute eine Trainingskarte und diskutiere sie mit </a:t>
+            </a:r>
+            <a:r>
+              <a:rPr lang="de-DE" dirty="0" smtClean="0"/>
+              <a:t>Deinem </a:t>
+            </a:r>
+            <a:r>
+              <a:rPr lang="de-DE" dirty="0"/>
+              <a:t>Team oder einem Music </a:t>
+            </a:r>
+            <a:r>
+              <a:rPr lang="de-DE" dirty="0" err="1"/>
+              <a:t>Moves</a:t>
+            </a:r>
+            <a:r>
+              <a:rPr lang="de-DE" dirty="0"/>
+              <a:t> Trainer</a:t>
+            </a:r>
+            <a:r>
+              <a:rPr lang="de-DE" dirty="0" smtClean="0"/>
+              <a:t>.</a:t>
+            </a:r>
+            <a:endParaRPr lang="de-DE" dirty="0"/>
+          </a:p>
+          <a:p>
+            <a:r>
+              <a:rPr lang="de-DE" dirty="0"/>
+              <a:t>Arbeite das Feedback in das Layout Deiner Karte ein.</a:t>
+            </a:r>
+          </a:p>
+          <a:p>
+            <a:pPr marL="0" indent="0">
+              <a:buNone/>
+            </a:pPr>
+            <a:r>
+              <a:rPr lang="de-DE" dirty="0"/>
+              <a:t> </a:t>
+            </a:r>
+            <a:endParaRPr lang="de-DE" dirty="0"/>
           </a:p>
         </p:txBody>
       </p:sp>

</xml_diff>

<commit_message>
TRC 03,05,06,07 Name geändert und Blocksatz
</commit_message>
<xml_diff>
--- a/training-cards/music moves/Training Cards (TRC)/ger/apprentice/ger_TRC_03_Trainingskarte_layouten_MM_A.pptx
+++ b/training-cards/music moves/Training Cards (TRC)/ger/apprentice/ger_TRC_03_Trainingskarte_layouten_MM_A.pptx
@@ -579,7 +579,7 @@
           <a:p>
             <a:fld id="{FF5B2BAF-DF38-0A48-A798-0C06E514FD52}" type="datetimeFigureOut">
               <a:rPr lang="de-DE" smtClean="0"/>
-              <a:t>25.07.23</a:t>
+              <a:t>04.08.24</a:t>
             </a:fld>
             <a:endParaRPr lang="de-DE" dirty="0"/>
           </a:p>
@@ -799,7 +799,7 @@
           <a:p>
             <a:fld id="{FF5B2BAF-DF38-0A48-A798-0C06E514FD52}" type="datetimeFigureOut">
               <a:rPr lang="de-DE" smtClean="0"/>
-              <a:t>25.07.23</a:t>
+              <a:t>04.08.24</a:t>
             </a:fld>
             <a:endParaRPr lang="de-DE" dirty="0"/>
           </a:p>
@@ -1462,13 +1462,19 @@
             <p:ph idx="13"/>
           </p:nvPr>
         </p:nvSpPr>
-        <p:spPr/>
+        <p:spPr>
+          <a:xfrm>
+            <a:off x="858838" y="1568452"/>
+            <a:ext cx="6260419" cy="3133835"/>
+          </a:xfrm>
+        </p:spPr>
         <p:txBody>
           <a:bodyPr>
-            <a:normAutofit fontScale="92500" lnSpcReduction="10000"/>
+            <a:normAutofit fontScale="92500"/>
           </a:bodyPr>
           <a:lstStyle/>
           <a:p>
+            <a:pPr algn="just"/>
             <a:r>
               <a:rPr lang="de-DE" dirty="0"/>
               <a:t>Das Layout der Trainingskarten wurde professionell entworfen. Es steht in </a:t>
@@ -1517,6 +1523,7 @@
             </a:endParaRPr>
           </a:p>
           <a:p>
+            <a:pPr algn="just"/>
             <a:r>
               <a:rPr lang="de-DE" dirty="0"/>
               <a:t>Beim </a:t>
@@ -1531,6 +1538,7 @@
             </a:r>
           </a:p>
           <a:p>
+            <a:pPr algn="just"/>
             <a:r>
               <a:rPr lang="de-DE" dirty="0"/>
               <a:t>Der Titel neben dem Logo ist 24 </a:t>
@@ -1561,20 +1569,14 @@
             </a:r>
           </a:p>
           <a:p>
-            <a:r>
-              <a:rPr lang="de-DE" dirty="0"/>
-              <a:t>Unterhalb des Titels </a:t>
-            </a:r>
-            <a:r>
-              <a:rPr lang="de-DE" dirty="0" err="1"/>
-              <a:t>kan</a:t>
-            </a:r>
-            <a:r>
-              <a:rPr lang="de-DE" dirty="0"/>
-              <a:t> der volle Name des Autors in Avenir mit dunkelgrauen Großbuchstaben stehen, daneben das Datum der letzten Änderung in grauer, normaler Schrift.</a:t>
-            </a:r>
-          </a:p>
-          <a:p>
+            <a:pPr algn="just"/>
+            <a:r>
+              <a:rPr lang="de-DE" dirty="0"/>
+              <a:t>Unterhalb des Titels kann der volle Name des Autors in Avenir mit dunkelgrauen Großbuchstaben stehen, daneben das Datum der letzten Änderung in grauer, normaler Schrift.</a:t>
+            </a:r>
+          </a:p>
+          <a:p>
+            <a:pPr algn="just"/>
             <a:r>
               <a:rPr lang="de-DE" dirty="0"/>
               <a:t>Die </a:t>
@@ -1597,6 +1599,7 @@
             </a:r>
           </a:p>
           <a:p>
+            <a:pPr algn="just"/>
             <a:r>
               <a:rPr lang="de-DE" dirty="0"/>
               <a:t>Textgröße variiert zwischen 8 </a:t>
@@ -1619,12 +1622,14 @@
             </a:r>
           </a:p>
           <a:p>
-            <a:r>
-              <a:rPr lang="de-DE" dirty="0"/>
-              <a:t>Die Anrede auf der Karte ist „per Du“, wobei das „Du“ groß geschrieben wird.</a:t>
-            </a:r>
-          </a:p>
-          <a:p>
+            <a:pPr algn="just"/>
+            <a:r>
+              <a:rPr lang="de-DE" dirty="0"/>
+              <a:t>Die Anrede auf der Karte ist das „Du“, wobei das „Du“ groß geschrieben wird.</a:t>
+            </a:r>
+          </a:p>
+          <a:p>
+            <a:pPr algn="just"/>
             <a:r>
               <a:rPr lang="de-DE" dirty="0"/>
               <a:t>Auf der Rückseite sind die </a:t>
@@ -1639,6 +1644,7 @@
             </a:r>
           </a:p>
           <a:p>
+            <a:pPr algn="just"/>
             <a:r>
               <a:rPr lang="de-DE" dirty="0"/>
               <a:t>Je nach Level sollte auf der Rückseite rechts unten das entsprechende Icon eingefügt werden. Standard ist das </a:t>
@@ -1661,6 +1667,7 @@
             </a:r>
           </a:p>
           <a:p>
+            <a:pPr algn="just"/>
             <a:r>
               <a:rPr lang="de-DE" dirty="0"/>
               <a:t>Im rechten oberen Eck gibt es für jede Trainingskarte eine Signatur. Du kannst Dir selbst ein Identifizierungskonzept ausdenken. Wenn Du eine offizielle Signatur von der </a:t>
@@ -1683,6 +1690,7 @@
             </a:r>
           </a:p>
           <a:p>
+            <a:pPr algn="just"/>
             <a:r>
               <a:rPr lang="de-DE" dirty="0"/>
               <a:t>Wenn Du Deine Trainingskarte rechtlich schützen lassen willst, kannst Du auf der Rückseite unten mittig eine Creative </a:t>

</xml_diff>